<commit_message>
update results pca+cluster all ppt
</commit_message>
<xml_diff>
--- a/presentation_CARLASSARA_10601118.pptx
+++ b/presentation_CARLASSARA_10601118.pptx
@@ -17,13 +17,13 @@
     <p:sldId id="312" r:id="rId11"/>
     <p:sldId id="315" r:id="rId12"/>
     <p:sldId id="319" r:id="rId13"/>
-    <p:sldId id="323" r:id="rId14"/>
-    <p:sldId id="325" r:id="rId15"/>
+    <p:sldId id="320" r:id="rId14"/>
+    <p:sldId id="323" r:id="rId15"/>
     <p:sldId id="326" r:id="rId16"/>
-    <p:sldId id="320" r:id="rId17"/>
-    <p:sldId id="321" r:id="rId18"/>
-    <p:sldId id="316" r:id="rId19"/>
-    <p:sldId id="322" r:id="rId20"/>
+    <p:sldId id="321" r:id="rId17"/>
+    <p:sldId id="316" r:id="rId18"/>
+    <p:sldId id="327" r:id="rId19"/>
+    <p:sldId id="328" r:id="rId20"/>
     <p:sldId id="287" r:id="rId21"/>
   </p:sldIdLst>
   <p:sldSz cx="12192000" cy="6858000"/>
@@ -126,7 +126,7 @@
   <p:extLst>
     <p:ext uri="{EFAFB233-063F-42B5-8137-9DF3F51BA10A}">
       <p15:sldGuideLst xmlns:p15="http://schemas.microsoft.com/office/powerpoint/2012/main">
-        <p15:guide id="3" pos="240" userDrawn="1">
+        <p15:guide id="3" pos="3792" userDrawn="1">
           <p15:clr>
             <a:srgbClr val="A4A3A4"/>
           </p15:clr>
@@ -136,7 +136,7 @@
             <a:srgbClr val="A4A3A4"/>
           </p15:clr>
         </p15:guide>
-        <p15:guide id="5" orient="horz" pos="624" userDrawn="1">
+        <p15:guide id="5" orient="horz" pos="336" userDrawn="1">
           <p15:clr>
             <a:srgbClr val="A4A3A4"/>
           </p15:clr>
@@ -248,7 +248,7 @@
           <a:p>
             <a:fld id="{2E347CE9-1F5D-4CEF-9CA7-664B3EF9808B}" type="datetimeFigureOut">
               <a:rPr lang="en-GB" smtClean="0"/>
-              <a:t>09/07/2024</a:t>
+              <a:t>10/07/2024</a:t>
             </a:fld>
             <a:endParaRPr lang="en-GB"/>
           </a:p>
@@ -655,7 +655,7 @@
           <a:p>
             <a:fld id="{1D8BD707-D9CF-40AE-B4C6-C98DA3205C09}" type="datetimeFigureOut">
               <a:rPr lang="en-US"/>
-              <a:t>7/9/2024</a:t>
+              <a:t>7/10/2024</a:t>
             </a:fld>
             <a:endParaRPr lang="en-US"/>
           </a:p>
@@ -830,7 +830,7 @@
           <a:p>
             <a:fld id="{1D8BD707-D9CF-40AE-B4C6-C98DA3205C09}" type="datetimeFigureOut">
               <a:rPr lang="en-US"/>
-              <a:t>7/9/2024</a:t>
+              <a:t>7/10/2024</a:t>
             </a:fld>
             <a:endParaRPr lang="en-US"/>
           </a:p>
@@ -1044,7 +1044,7 @@
           <a:p>
             <a:fld id="{1D8BD707-D9CF-40AE-B4C6-C98DA3205C09}" type="datetimeFigureOut">
               <a:rPr lang="en-US"/>
-              <a:t>7/9/2024</a:t>
+              <a:t>7/10/2024</a:t>
             </a:fld>
             <a:endParaRPr lang="en-US"/>
           </a:p>
@@ -1192,7 +1192,7 @@
           <a:p>
             <a:fld id="{1D8BD707-D9CF-40AE-B4C6-C98DA3205C09}" type="datetimeFigureOut">
               <a:rPr lang="en-US"/>
-              <a:t>7/9/2024</a:t>
+              <a:t>7/10/2024</a:t>
             </a:fld>
             <a:endParaRPr lang="en-US"/>
           </a:p>
@@ -1311,7 +1311,7 @@
           <a:p>
             <a:fld id="{1D8BD707-D9CF-40AE-B4C6-C98DA3205C09}" type="datetimeFigureOut">
               <a:rPr lang="en-US"/>
-              <a:t>7/9/2024</a:t>
+              <a:t>7/10/2024</a:t>
             </a:fld>
             <a:endParaRPr lang="en-US"/>
           </a:p>
@@ -1680,7 +1680,7 @@
           <a:p>
             <a:fld id="{1D8BD707-D9CF-40AE-B4C6-C98DA3205C09}" type="datetimeFigureOut">
               <a:rPr lang="en-US"/>
-              <a:t>7/9/2024</a:t>
+              <a:t>7/10/2024</a:t>
             </a:fld>
             <a:endParaRPr lang="en-US"/>
           </a:p>
@@ -2486,55 +2486,12 @@
           <a:chExt cx="0" cy="0"/>
         </a:xfrm>
       </p:grpSpPr>
-      <p:sp>
-        <p:nvSpPr>
-          <p:cNvPr id="18" name="Rectangle 17">
-            <a:extLst>
-              <a:ext uri="{FF2B5EF4-FFF2-40B4-BE49-F238E27FC236}">
-                <a16:creationId xmlns:a16="http://schemas.microsoft.com/office/drawing/2014/main" id="{00681E6F-C40A-4ED0-9D53-D34104B4964F}"/>
-              </a:ext>
-            </a:extLst>
-          </p:cNvPr>
-          <p:cNvSpPr/>
-          <p:nvPr/>
-        </p:nvSpPr>
-        <p:spPr>
-          <a:xfrm>
-            <a:off x="228600" y="6359452"/>
-            <a:ext cx="2063385" cy="338554"/>
-          </a:xfrm>
-          <a:prstGeom prst="rect">
-            <a:avLst/>
-          </a:prstGeom>
-        </p:spPr>
-        <p:txBody>
-          <a:bodyPr wrap="none">
-            <a:spAutoFit/>
-          </a:bodyPr>
-          <a:lstStyle/>
-          <a:p>
-            <a:r>
-              <a:rPr lang="it-IT" sz="1600">
-                <a:latin typeface="Futura"/>
-                <a:ea typeface="Microsoft Sans Serif" panose="020B0604020202020204" pitchFamily="34" charset="0"/>
-                <a:cs typeface="Microsoft Sans Serif" panose="020B0604020202020204" pitchFamily="34" charset="0"/>
-              </a:rPr>
-              <a:t>Lorenzo Carlassara</a:t>
-            </a:r>
-            <a:endParaRPr lang="it-IT" sz="1600" dirty="0">
-              <a:latin typeface="Futura"/>
-              <a:ea typeface="Microsoft Sans Serif" panose="020B0604020202020204" pitchFamily="34" charset="0"/>
-              <a:cs typeface="Microsoft Sans Serif" panose="020B0604020202020204" pitchFamily="34" charset="0"/>
-            </a:endParaRPr>
-          </a:p>
-        </p:txBody>
-      </p:sp>
       <p:pic>
         <p:nvPicPr>
-          <p:cNvPr id="19" name="Picture 18">
-            <a:extLst>
-              <a:ext uri="{FF2B5EF4-FFF2-40B4-BE49-F238E27FC236}">
-                <a16:creationId xmlns:a16="http://schemas.microsoft.com/office/drawing/2014/main" id="{B2B2A884-A15F-4E1B-9F93-24E6A16C5246}"/>
+          <p:cNvPr id="7" name="Picture 6">
+            <a:extLst>
+              <a:ext uri="{FF2B5EF4-FFF2-40B4-BE49-F238E27FC236}">
+                <a16:creationId xmlns:a16="http://schemas.microsoft.com/office/drawing/2014/main" id="{B220E16B-DFF0-42A7-836E-E7D494F2B637}"/>
               </a:ext>
             </a:extLst>
           </p:cNvPr>
@@ -2543,43 +2500,8 @@
           </p:cNvPicPr>
           <p:nvPr/>
         </p:nvPicPr>
-        <p:blipFill rotWithShape="1">
-          <a:blip r:embed="rId2">
-            <a:extLst>
-              <a:ext uri="{28A0092B-C50C-407E-A947-70E740481C1C}">
-                <a14:useLocalDpi xmlns:a14="http://schemas.microsoft.com/office/drawing/2010/main" val="0"/>
-              </a:ext>
-            </a:extLst>
-          </a:blip>
-          <a:srcRect l="25190" r="25955" b="38216"/>
-          <a:stretch/>
-        </p:blipFill>
-        <p:spPr>
-          <a:xfrm>
-            <a:off x="10734080" y="6172326"/>
-            <a:ext cx="677505" cy="627889"/>
-          </a:xfrm>
-          <a:prstGeom prst="rect">
-            <a:avLst/>
-          </a:prstGeom>
-        </p:spPr>
-      </p:pic>
-      <p:pic>
-        <p:nvPicPr>
-          <p:cNvPr id="20" name="Picture 19">
-            <a:extLst>
-              <a:ext uri="{FF2B5EF4-FFF2-40B4-BE49-F238E27FC236}">
-                <a16:creationId xmlns:a16="http://schemas.microsoft.com/office/drawing/2014/main" id="{1DBAE88E-FFC9-4BC0-9DE5-9B7CA7691256}"/>
-              </a:ext>
-            </a:extLst>
-          </p:cNvPr>
-          <p:cNvPicPr>
-            <a:picLocks noChangeAspect="1"/>
-          </p:cNvPicPr>
-          <p:nvPr/>
-        </p:nvPicPr>
         <p:blipFill>
-          <a:blip r:embed="rId3" cstate="print">
+          <a:blip r:embed="rId2" cstate="print">
             <a:extLst>
               <a:ext uri="{28A0092B-C50C-407E-A947-70E740481C1C}">
                 <a14:useLocalDpi xmlns:a14="http://schemas.microsoft.com/office/drawing/2010/main" val="0"/>
@@ -2600,83 +2522,12 @@
           </a:prstGeom>
         </p:spPr>
       </p:pic>
-      <p:sp>
-        <p:nvSpPr>
-          <p:cNvPr id="21" name="Textfeld 99">
-            <a:extLst>
-              <a:ext uri="{FF2B5EF4-FFF2-40B4-BE49-F238E27FC236}">
-                <a16:creationId xmlns:a16="http://schemas.microsoft.com/office/drawing/2014/main" id="{0803C2D1-1B12-4681-99BA-94ACF45F635F}"/>
-              </a:ext>
-            </a:extLst>
-          </p:cNvPr>
-          <p:cNvSpPr txBox="1"/>
-          <p:nvPr/>
-        </p:nvSpPr>
-        <p:spPr>
-          <a:xfrm>
-            <a:off x="-10886" y="152400"/>
-            <a:ext cx="12192000" cy="353943"/>
-          </a:xfrm>
-          <a:prstGeom prst="rect">
-            <a:avLst/>
-          </a:prstGeom>
-          <a:noFill/>
-        </p:spPr>
-        <p:txBody>
-          <a:bodyPr wrap="square" rtlCol="0">
-            <a:spAutoFit/>
-          </a:bodyPr>
-          <a:lstStyle/>
-          <a:p>
-            <a:pPr algn="ctr"/>
-            <a:r>
-              <a:rPr lang="en-US" sz="1700">
-                <a:latin typeface="Futura"/>
-                <a:cs typeface="Times New Roman" panose="02020603050405020304" pitchFamily="18" charset="0"/>
-              </a:rPr>
-              <a:t>Active learning method</a:t>
-            </a:r>
-            <a:r>
-              <a:rPr lang="de-DE" sz="1700">
-                <a:latin typeface="Futura"/>
-                <a:cs typeface="Times New Roman" panose="02020603050405020304" pitchFamily="18" charset="0"/>
-              </a:rPr>
-              <a:t> </a:t>
-            </a:r>
-            <a:r>
-              <a:rPr lang="en-US" sz="1700">
-                <a:latin typeface="Futura"/>
-                <a:cs typeface="Times New Roman" panose="02020603050405020304" pitchFamily="18" charset="0"/>
-              </a:rPr>
-              <a:t>for</a:t>
-            </a:r>
-            <a:r>
-              <a:rPr lang="de-DE" sz="1700">
-                <a:latin typeface="Futura"/>
-                <a:cs typeface="Times New Roman" panose="02020603050405020304" pitchFamily="18" charset="0"/>
-              </a:rPr>
-              <a:t> </a:t>
-            </a:r>
-            <a:r>
-              <a:rPr lang="en-US" sz="1700">
-                <a:latin typeface="Futura"/>
-                <a:cs typeface="Times New Roman" panose="02020603050405020304" pitchFamily="18" charset="0"/>
-              </a:rPr>
-              <a:t>Virtual Support Vector Machine with self-learning constraints</a:t>
-            </a:r>
-            <a:endParaRPr lang="de-DE" sz="1700" dirty="0">
-              <a:latin typeface="Futura"/>
-              <a:cs typeface="Times New Roman" panose="02020603050405020304" pitchFamily="18" charset="0"/>
-            </a:endParaRPr>
-          </a:p>
-        </p:txBody>
-      </p:sp>
       <p:pic>
         <p:nvPicPr>
-          <p:cNvPr id="9" name="Picture 8">
-            <a:extLst>
-              <a:ext uri="{FF2B5EF4-FFF2-40B4-BE49-F238E27FC236}">
-                <a16:creationId xmlns:a16="http://schemas.microsoft.com/office/drawing/2014/main" id="{3C1FB4F2-E763-40AE-8788-8D86F0F83971}"/>
+          <p:cNvPr id="8" name="Picture 7">
+            <a:extLst>
+              <a:ext uri="{FF2B5EF4-FFF2-40B4-BE49-F238E27FC236}">
+                <a16:creationId xmlns:a16="http://schemas.microsoft.com/office/drawing/2014/main" id="{C300C08F-7400-4B95-9451-8B73FBF2A62E}"/>
               </a:ext>
             </a:extLst>
           </p:cNvPr>
@@ -2685,8 +2536,43 @@
           </p:cNvPicPr>
           <p:nvPr/>
         </p:nvPicPr>
+        <p:blipFill rotWithShape="1">
+          <a:blip r:embed="rId3">
+            <a:extLst>
+              <a:ext uri="{28A0092B-C50C-407E-A947-70E740481C1C}">
+                <a14:useLocalDpi xmlns:a14="http://schemas.microsoft.com/office/drawing/2010/main" val="0"/>
+              </a:ext>
+            </a:extLst>
+          </a:blip>
+          <a:srcRect l="25190" r="25955" b="38216"/>
+          <a:stretch/>
+        </p:blipFill>
+        <p:spPr>
+          <a:xfrm>
+            <a:off x="8295" y="6172200"/>
+            <a:ext cx="677505" cy="627889"/>
+          </a:xfrm>
+          <a:prstGeom prst="rect">
+            <a:avLst/>
+          </a:prstGeom>
+        </p:spPr>
+      </p:pic>
+      <p:pic>
+        <p:nvPicPr>
+          <p:cNvPr id="4" name="Picture 3">
+            <a:extLst>
+              <a:ext uri="{FF2B5EF4-FFF2-40B4-BE49-F238E27FC236}">
+                <a16:creationId xmlns:a16="http://schemas.microsoft.com/office/drawing/2014/main" id="{2F4AA90F-D82F-4C47-AEF5-D3A0609D33FD}"/>
+              </a:ext>
+            </a:extLst>
+          </p:cNvPr>
+          <p:cNvPicPr>
+            <a:picLocks noChangeAspect="1"/>
+          </p:cNvPicPr>
+          <p:nvPr/>
+        </p:nvPicPr>
         <p:blipFill>
-          <a:blip r:embed="rId4">
+          <a:blip r:embed="rId4" cstate="print">
             <a:extLst>
               <a:ext uri="{28A0092B-C50C-407E-A947-70E740481C1C}">
                 <a14:useLocalDpi xmlns:a14="http://schemas.microsoft.com/office/drawing/2010/main" val="0"/>
@@ -2699,8 +2585,116 @@
         </p:blipFill>
         <p:spPr>
           <a:xfrm>
-            <a:off x="838292" y="838200"/>
-            <a:ext cx="10284483" cy="4620647"/>
+            <a:off x="1143000" y="72151"/>
+            <a:ext cx="4191001" cy="3352800"/>
+          </a:xfrm>
+          <a:prstGeom prst="rect">
+            <a:avLst/>
+          </a:prstGeom>
+        </p:spPr>
+      </p:pic>
+      <p:pic>
+        <p:nvPicPr>
+          <p:cNvPr id="5" name="Picture 4">
+            <a:extLst>
+              <a:ext uri="{FF2B5EF4-FFF2-40B4-BE49-F238E27FC236}">
+                <a16:creationId xmlns:a16="http://schemas.microsoft.com/office/drawing/2014/main" id="{1C764EE1-0CED-4D22-B880-E2EA85A25F21}"/>
+              </a:ext>
+            </a:extLst>
+          </p:cNvPr>
+          <p:cNvPicPr>
+            <a:picLocks noChangeAspect="1"/>
+          </p:cNvPicPr>
+          <p:nvPr/>
+        </p:nvPicPr>
+        <p:blipFill>
+          <a:blip r:embed="rId5" cstate="print">
+            <a:extLst>
+              <a:ext uri="{28A0092B-C50C-407E-A947-70E740481C1C}">
+                <a14:useLocalDpi xmlns:a14="http://schemas.microsoft.com/office/drawing/2010/main" val="0"/>
+              </a:ext>
+            </a:extLst>
+          </a:blip>
+          <a:stretch>
+            <a:fillRect/>
+          </a:stretch>
+        </p:blipFill>
+        <p:spPr>
+          <a:xfrm>
+            <a:off x="6849989" y="72151"/>
+            <a:ext cx="4191000" cy="3352800"/>
+          </a:xfrm>
+          <a:prstGeom prst="rect">
+            <a:avLst/>
+          </a:prstGeom>
+        </p:spPr>
+      </p:pic>
+      <p:pic>
+        <p:nvPicPr>
+          <p:cNvPr id="6" name="Picture 5">
+            <a:extLst>
+              <a:ext uri="{FF2B5EF4-FFF2-40B4-BE49-F238E27FC236}">
+                <a16:creationId xmlns:a16="http://schemas.microsoft.com/office/drawing/2014/main" id="{A543A837-245A-4626-A76A-D9F0033D9D26}"/>
+              </a:ext>
+            </a:extLst>
+          </p:cNvPr>
+          <p:cNvPicPr>
+            <a:picLocks noChangeAspect="1"/>
+          </p:cNvPicPr>
+          <p:nvPr/>
+        </p:nvPicPr>
+        <p:blipFill>
+          <a:blip r:embed="rId6" cstate="print">
+            <a:extLst>
+              <a:ext uri="{28A0092B-C50C-407E-A947-70E740481C1C}">
+                <a14:useLocalDpi xmlns:a14="http://schemas.microsoft.com/office/drawing/2010/main" val="0"/>
+              </a:ext>
+            </a:extLst>
+          </a:blip>
+          <a:stretch>
+            <a:fillRect/>
+          </a:stretch>
+        </p:blipFill>
+        <p:spPr>
+          <a:xfrm>
+            <a:off x="1147678" y="3383057"/>
+            <a:ext cx="4191001" cy="3352800"/>
+          </a:xfrm>
+          <a:prstGeom prst="rect">
+            <a:avLst/>
+          </a:prstGeom>
+        </p:spPr>
+      </p:pic>
+      <p:pic>
+        <p:nvPicPr>
+          <p:cNvPr id="9" name="Picture 8">
+            <a:extLst>
+              <a:ext uri="{FF2B5EF4-FFF2-40B4-BE49-F238E27FC236}">
+                <a16:creationId xmlns:a16="http://schemas.microsoft.com/office/drawing/2014/main" id="{BE8D759D-05E7-496D-8480-230A5398986D}"/>
+              </a:ext>
+            </a:extLst>
+          </p:cNvPr>
+          <p:cNvPicPr>
+            <a:picLocks noChangeAspect="1"/>
+          </p:cNvPicPr>
+          <p:nvPr/>
+        </p:nvPicPr>
+        <p:blipFill>
+          <a:blip r:embed="rId7" cstate="print">
+            <a:extLst>
+              <a:ext uri="{28A0092B-C50C-407E-A947-70E740481C1C}">
+                <a14:useLocalDpi xmlns:a14="http://schemas.microsoft.com/office/drawing/2010/main" val="0"/>
+              </a:ext>
+            </a:extLst>
+          </a:blip>
+          <a:stretch>
+            <a:fillRect/>
+          </a:stretch>
+        </p:blipFill>
+        <p:spPr>
+          <a:xfrm>
+            <a:off x="6846023" y="3383057"/>
+            <a:ext cx="4191000" cy="3352800"/>
           </a:xfrm>
           <a:prstGeom prst="rect">
             <a:avLst/>
@@ -2710,7 +2704,7 @@
     </p:spTree>
     <p:extLst>
       <p:ext uri="{BB962C8B-B14F-4D97-AF65-F5344CB8AC3E}">
-        <p14:creationId xmlns:p14="http://schemas.microsoft.com/office/powerpoint/2010/main" val="1582237575"/>
+        <p14:creationId xmlns:p14="http://schemas.microsoft.com/office/powerpoint/2010/main" val="3479168626"/>
       </p:ext>
     </p:extLst>
   </p:cSld>
@@ -2924,10 +2918,10 @@
       </p:sp>
       <p:pic>
         <p:nvPicPr>
-          <p:cNvPr id="22" name="Picture 21">
-            <a:extLst>
-              <a:ext uri="{FF2B5EF4-FFF2-40B4-BE49-F238E27FC236}">
-                <a16:creationId xmlns:a16="http://schemas.microsoft.com/office/drawing/2014/main" id="{25A41A61-5800-4F87-ABCE-A63B4DBBBC43}"/>
+          <p:cNvPr id="9" name="Picture 8">
+            <a:extLst>
+              <a:ext uri="{FF2B5EF4-FFF2-40B4-BE49-F238E27FC236}">
+                <a16:creationId xmlns:a16="http://schemas.microsoft.com/office/drawing/2014/main" id="{3C1FB4F2-E763-40AE-8788-8D86F0F83971}"/>
               </a:ext>
             </a:extLst>
           </p:cNvPr>
@@ -2950,8 +2944,8 @@
         </p:blipFill>
         <p:spPr>
           <a:xfrm>
-            <a:off x="838200" y="830941"/>
-            <a:ext cx="10062669" cy="4751029"/>
+            <a:off x="838292" y="838200"/>
+            <a:ext cx="10284483" cy="4620647"/>
           </a:xfrm>
           <a:prstGeom prst="rect">
             <a:avLst/>
@@ -2961,7 +2955,7 @@
     </p:spTree>
     <p:extLst>
       <p:ext uri="{BB962C8B-B14F-4D97-AF65-F5344CB8AC3E}">
-        <p14:creationId xmlns:p14="http://schemas.microsoft.com/office/powerpoint/2010/main" val="133106940"/>
+        <p14:creationId xmlns:p14="http://schemas.microsoft.com/office/powerpoint/2010/main" val="1582237575"/>
       </p:ext>
     </p:extLst>
   </p:cSld>
@@ -3312,10 +3306,10 @@
       </p:pic>
       <p:pic>
         <p:nvPicPr>
-          <p:cNvPr id="4" name="Picture 3">
-            <a:extLst>
-              <a:ext uri="{FF2B5EF4-FFF2-40B4-BE49-F238E27FC236}">
-                <a16:creationId xmlns:a16="http://schemas.microsoft.com/office/drawing/2014/main" id="{2F4AA90F-D82F-4C47-AEF5-D3A0609D33FD}"/>
+          <p:cNvPr id="3" name="Picture 2">
+            <a:extLst>
+              <a:ext uri="{FF2B5EF4-FFF2-40B4-BE49-F238E27FC236}">
+                <a16:creationId xmlns:a16="http://schemas.microsoft.com/office/drawing/2014/main" id="{670DA7F4-3C6A-44C4-B938-CE885B9DBDA5}"/>
               </a:ext>
             </a:extLst>
           </p:cNvPr>
@@ -3325,7 +3319,7 @@
           <p:nvPr/>
         </p:nvPicPr>
         <p:blipFill>
-          <a:blip r:embed="rId4">
+          <a:blip r:embed="rId4" cstate="print">
             <a:extLst>
               <a:ext uri="{28A0092B-C50C-407E-A947-70E740481C1C}">
                 <a14:useLocalDpi xmlns:a14="http://schemas.microsoft.com/office/drawing/2010/main" val="0"/>
@@ -3338,8 +3332,44 @@
         </p:blipFill>
         <p:spPr>
           <a:xfrm>
-            <a:off x="1809750" y="0"/>
-            <a:ext cx="8572500" cy="6858000"/>
+            <a:off x="0" y="304800"/>
+            <a:ext cx="6096000" cy="4876800"/>
+          </a:xfrm>
+          <a:prstGeom prst="rect">
+            <a:avLst/>
+          </a:prstGeom>
+        </p:spPr>
+      </p:pic>
+      <p:pic>
+        <p:nvPicPr>
+          <p:cNvPr id="6" name="Picture 5">
+            <a:extLst>
+              <a:ext uri="{FF2B5EF4-FFF2-40B4-BE49-F238E27FC236}">
+                <a16:creationId xmlns:a16="http://schemas.microsoft.com/office/drawing/2014/main" id="{9DE06DE2-BEA6-4831-BDF1-0316AD477DFF}"/>
+              </a:ext>
+            </a:extLst>
+          </p:cNvPr>
+          <p:cNvPicPr>
+            <a:picLocks noChangeAspect="1"/>
+          </p:cNvPicPr>
+          <p:nvPr/>
+        </p:nvPicPr>
+        <p:blipFill>
+          <a:blip r:embed="rId5" cstate="print">
+            <a:extLst>
+              <a:ext uri="{28A0092B-C50C-407E-A947-70E740481C1C}">
+                <a14:useLocalDpi xmlns:a14="http://schemas.microsoft.com/office/drawing/2010/main" val="0"/>
+              </a:ext>
+            </a:extLst>
+          </a:blip>
+          <a:stretch>
+            <a:fillRect/>
+          </a:stretch>
+        </p:blipFill>
+        <p:spPr>
+          <a:xfrm>
+            <a:off x="6096000" y="304800"/>
+            <a:ext cx="6096000" cy="4876800"/>
           </a:xfrm>
           <a:prstGeom prst="rect">
             <a:avLst/>
@@ -3349,7 +3379,7 @@
     </p:spTree>
     <p:extLst>
       <p:ext uri="{BB962C8B-B14F-4D97-AF65-F5344CB8AC3E}">
-        <p14:creationId xmlns:p14="http://schemas.microsoft.com/office/powerpoint/2010/main" val="3479168626"/>
+        <p14:creationId xmlns:p14="http://schemas.microsoft.com/office/powerpoint/2010/main" val="1463249048"/>
       </p:ext>
     </p:extLst>
   </p:cSld>
@@ -3452,7 +3482,7 @@
           <p:cNvPr id="4" name="Picture 3">
             <a:extLst>
               <a:ext uri="{FF2B5EF4-FFF2-40B4-BE49-F238E27FC236}">
-                <a16:creationId xmlns:a16="http://schemas.microsoft.com/office/drawing/2014/main" id="{31FAEA5C-25FD-4AEE-8EAA-8E7BAF51B8AC}"/>
+                <a16:creationId xmlns:a16="http://schemas.microsoft.com/office/drawing/2014/main" id="{D8A99D0B-68D5-480B-B335-D6F6124EA9D5}"/>
               </a:ext>
             </a:extLst>
           </p:cNvPr>
@@ -3462,7 +3492,7 @@
           <p:nvPr/>
         </p:nvPicPr>
         <p:blipFill>
-          <a:blip r:embed="rId4">
+          <a:blip r:embed="rId4" cstate="print">
             <a:extLst>
               <a:ext uri="{28A0092B-C50C-407E-A947-70E740481C1C}">
                 <a14:useLocalDpi xmlns:a14="http://schemas.microsoft.com/office/drawing/2010/main" val="0"/>
@@ -3475,8 +3505,44 @@
         </p:blipFill>
         <p:spPr>
           <a:xfrm>
-            <a:off x="1809750" y="0"/>
-            <a:ext cx="8572500" cy="6858000"/>
+            <a:off x="0" y="304800"/>
+            <a:ext cx="6096000" cy="4876800"/>
+          </a:xfrm>
+          <a:prstGeom prst="rect">
+            <a:avLst/>
+          </a:prstGeom>
+        </p:spPr>
+      </p:pic>
+      <p:pic>
+        <p:nvPicPr>
+          <p:cNvPr id="10" name="Picture 9">
+            <a:extLst>
+              <a:ext uri="{FF2B5EF4-FFF2-40B4-BE49-F238E27FC236}">
+                <a16:creationId xmlns:a16="http://schemas.microsoft.com/office/drawing/2014/main" id="{52C055B9-55D4-401E-94FE-CE2D04CDB98B}"/>
+              </a:ext>
+            </a:extLst>
+          </p:cNvPr>
+          <p:cNvPicPr>
+            <a:picLocks noChangeAspect="1"/>
+          </p:cNvPicPr>
+          <p:nvPr/>
+        </p:nvPicPr>
+        <p:blipFill>
+          <a:blip r:embed="rId5" cstate="print">
+            <a:extLst>
+              <a:ext uri="{28A0092B-C50C-407E-A947-70E740481C1C}">
+                <a14:useLocalDpi xmlns:a14="http://schemas.microsoft.com/office/drawing/2010/main" val="0"/>
+              </a:ext>
+            </a:extLst>
+          </a:blip>
+          <a:stretch>
+            <a:fillRect/>
+          </a:stretch>
+        </p:blipFill>
+        <p:spPr>
+          <a:xfrm>
+            <a:off x="6096000" y="304800"/>
+            <a:ext cx="6096000" cy="4876800"/>
           </a:xfrm>
           <a:prstGeom prst="rect">
             <a:avLst/>
@@ -3486,7 +3552,7 @@
     </p:spTree>
     <p:extLst>
       <p:ext uri="{BB962C8B-B14F-4D97-AF65-F5344CB8AC3E}">
-        <p14:creationId xmlns:p14="http://schemas.microsoft.com/office/powerpoint/2010/main" val="1463249048"/>
+        <p14:creationId xmlns:p14="http://schemas.microsoft.com/office/powerpoint/2010/main" val="3832956685"/>
       </p:ext>
     </p:extLst>
   </p:cSld>
@@ -3586,10 +3652,10 @@
       </p:pic>
       <p:pic>
         <p:nvPicPr>
-          <p:cNvPr id="3" name="Picture 2">
-            <a:extLst>
-              <a:ext uri="{FF2B5EF4-FFF2-40B4-BE49-F238E27FC236}">
-                <a16:creationId xmlns:a16="http://schemas.microsoft.com/office/drawing/2014/main" id="{5D95E256-F968-4D69-8829-1AD4807CFF64}"/>
+          <p:cNvPr id="10" name="Picture 9">
+            <a:extLst>
+              <a:ext uri="{FF2B5EF4-FFF2-40B4-BE49-F238E27FC236}">
+                <a16:creationId xmlns:a16="http://schemas.microsoft.com/office/drawing/2014/main" id="{B3172DCD-A98B-4CBB-B731-981469F70CF4}"/>
               </a:ext>
             </a:extLst>
           </p:cNvPr>
@@ -3599,7 +3665,7 @@
           <p:nvPr/>
         </p:nvPicPr>
         <p:blipFill>
-          <a:blip r:embed="rId4">
+          <a:blip r:embed="rId4" cstate="print">
             <a:extLst>
               <a:ext uri="{28A0092B-C50C-407E-A947-70E740481C1C}">
                 <a14:useLocalDpi xmlns:a14="http://schemas.microsoft.com/office/drawing/2010/main" val="0"/>
@@ -3612,8 +3678,44 @@
         </p:blipFill>
         <p:spPr>
           <a:xfrm>
-            <a:off x="1809750" y="0"/>
-            <a:ext cx="8572500" cy="6858000"/>
+            <a:off x="0" y="304800"/>
+            <a:ext cx="6095999" cy="4876799"/>
+          </a:xfrm>
+          <a:prstGeom prst="rect">
+            <a:avLst/>
+          </a:prstGeom>
+        </p:spPr>
+      </p:pic>
+      <p:pic>
+        <p:nvPicPr>
+          <p:cNvPr id="11" name="Picture 10">
+            <a:extLst>
+              <a:ext uri="{FF2B5EF4-FFF2-40B4-BE49-F238E27FC236}">
+                <a16:creationId xmlns:a16="http://schemas.microsoft.com/office/drawing/2014/main" id="{9D4C1F78-7DAC-4A65-97C8-396800C25B3F}"/>
+              </a:ext>
+            </a:extLst>
+          </p:cNvPr>
+          <p:cNvPicPr>
+            <a:picLocks noChangeAspect="1"/>
+          </p:cNvPicPr>
+          <p:nvPr/>
+        </p:nvPicPr>
+        <p:blipFill>
+          <a:blip r:embed="rId5" cstate="print">
+            <a:extLst>
+              <a:ext uri="{28A0092B-C50C-407E-A947-70E740481C1C}">
+                <a14:useLocalDpi xmlns:a14="http://schemas.microsoft.com/office/drawing/2010/main" val="0"/>
+              </a:ext>
+            </a:extLst>
+          </a:blip>
+          <a:stretch>
+            <a:fillRect/>
+          </a:stretch>
+        </p:blipFill>
+        <p:spPr>
+          <a:xfrm>
+            <a:off x="6095999" y="304800"/>
+            <a:ext cx="6096002" cy="4876801"/>
           </a:xfrm>
           <a:prstGeom prst="rect">
             <a:avLst/>
@@ -3623,7 +3725,7 @@
     </p:spTree>
     <p:extLst>
       <p:ext uri="{BB962C8B-B14F-4D97-AF65-F5344CB8AC3E}">
-        <p14:creationId xmlns:p14="http://schemas.microsoft.com/office/powerpoint/2010/main" val="3832956685"/>
+        <p14:creationId xmlns:p14="http://schemas.microsoft.com/office/powerpoint/2010/main" val="4129571936"/>
       </p:ext>
     </p:extLst>
   </p:cSld>
@@ -3723,10 +3825,10 @@
       </p:pic>
       <p:pic>
         <p:nvPicPr>
-          <p:cNvPr id="4" name="Picture 3">
-            <a:extLst>
-              <a:ext uri="{FF2B5EF4-FFF2-40B4-BE49-F238E27FC236}">
-                <a16:creationId xmlns:a16="http://schemas.microsoft.com/office/drawing/2014/main" id="{8EEBC6E7-AFBE-42A9-89BF-4EE96FAF6B56}"/>
+          <p:cNvPr id="13" name="Picture 12">
+            <a:extLst>
+              <a:ext uri="{FF2B5EF4-FFF2-40B4-BE49-F238E27FC236}">
+                <a16:creationId xmlns:a16="http://schemas.microsoft.com/office/drawing/2014/main" id="{919FAF43-7C05-4A02-BB43-C7D0C3A95188}"/>
               </a:ext>
             </a:extLst>
           </p:cNvPr>
@@ -3736,7 +3838,7 @@
           <p:nvPr/>
         </p:nvPicPr>
         <p:blipFill>
-          <a:blip r:embed="rId4">
+          <a:blip r:embed="rId4" cstate="print">
             <a:extLst>
               <a:ext uri="{28A0092B-C50C-407E-A947-70E740481C1C}">
                 <a14:useLocalDpi xmlns:a14="http://schemas.microsoft.com/office/drawing/2010/main" val="0"/>
@@ -3749,8 +3851,44 @@
         </p:blipFill>
         <p:spPr>
           <a:xfrm>
-            <a:off x="1809750" y="0"/>
-            <a:ext cx="8572500" cy="6858000"/>
+            <a:off x="6096000" y="306057"/>
+            <a:ext cx="6096000" cy="4876800"/>
+          </a:xfrm>
+          <a:prstGeom prst="rect">
+            <a:avLst/>
+          </a:prstGeom>
+        </p:spPr>
+      </p:pic>
+      <p:pic>
+        <p:nvPicPr>
+          <p:cNvPr id="14" name="Picture 13">
+            <a:extLst>
+              <a:ext uri="{FF2B5EF4-FFF2-40B4-BE49-F238E27FC236}">
+                <a16:creationId xmlns:a16="http://schemas.microsoft.com/office/drawing/2014/main" id="{4943E1C8-752F-4317-BD0E-33307EDFE41F}"/>
+              </a:ext>
+            </a:extLst>
+          </p:cNvPr>
+          <p:cNvPicPr>
+            <a:picLocks noChangeAspect="1"/>
+          </p:cNvPicPr>
+          <p:nvPr/>
+        </p:nvPicPr>
+        <p:blipFill>
+          <a:blip r:embed="rId5" cstate="print">
+            <a:extLst>
+              <a:ext uri="{28A0092B-C50C-407E-A947-70E740481C1C}">
+                <a14:useLocalDpi xmlns:a14="http://schemas.microsoft.com/office/drawing/2010/main" val="0"/>
+              </a:ext>
+            </a:extLst>
+          </a:blip>
+          <a:stretch>
+            <a:fillRect/>
+          </a:stretch>
+        </p:blipFill>
+        <p:spPr>
+          <a:xfrm>
+            <a:off x="0" y="306057"/>
+            <a:ext cx="6096000" cy="4876800"/>
           </a:xfrm>
           <a:prstGeom prst="rect">
             <a:avLst/>
@@ -3760,7 +3898,7 @@
     </p:spTree>
     <p:extLst>
       <p:ext uri="{BB962C8B-B14F-4D97-AF65-F5344CB8AC3E}">
-        <p14:creationId xmlns:p14="http://schemas.microsoft.com/office/powerpoint/2010/main" val="3420890579"/>
+        <p14:creationId xmlns:p14="http://schemas.microsoft.com/office/powerpoint/2010/main" val="3913308983"/>
       </p:ext>
     </p:extLst>
   </p:cSld>
@@ -11104,12 +11242,11 @@
 </file>
 
 <file path=customXml/item1.xml><?xml version="1.0" encoding="utf-8"?>
-<?mso-contentType ?>
-<FormTemplates xmlns="http://schemas.microsoft.com/sharepoint/v3/contenttype/forms">
-  <Display>DocumentLibraryForm</Display>
-  <Edit>DocumentLibraryForm</Edit>
-  <New>DocumentLibraryForm</New>
-</FormTemplates>
+<p:properties xmlns:p="http://schemas.microsoft.com/office/2006/metadata/properties" xmlns:xsi="http://www.w3.org/2001/XMLSchema-instance" xmlns:pc="http://schemas.microsoft.com/office/infopath/2007/PartnerControls">
+  <documentManagement>
+    <_activity xmlns="c9eab120-891d-4e75-bbb7-983661d36c9c" xsi:nil="true"/>
+  </documentManagement>
+</p:properties>
 </file>
 
 <file path=customXml/item2.xml><?xml version="1.0" encoding="utf-8"?>
@@ -11342,17 +11479,27 @@
 </file>
 
 <file path=customXml/item3.xml><?xml version="1.0" encoding="utf-8"?>
-<p:properties xmlns:p="http://schemas.microsoft.com/office/2006/metadata/properties" xmlns:xsi="http://www.w3.org/2001/XMLSchema-instance" xmlns:pc="http://schemas.microsoft.com/office/infopath/2007/PartnerControls">
-  <documentManagement>
-    <_activity xmlns="c9eab120-891d-4e75-bbb7-983661d36c9c" xsi:nil="true"/>
-  </documentManagement>
-</p:properties>
+<?mso-contentType ?>
+<FormTemplates xmlns="http://schemas.microsoft.com/sharepoint/v3/contenttype/forms">
+  <Display>DocumentLibraryForm</Display>
+  <Edit>DocumentLibraryForm</Edit>
+  <New>DocumentLibraryForm</New>
+</FormTemplates>
 </file>
 
 <file path=customXml/itemProps1.xml><?xml version="1.0" encoding="utf-8"?>
-<ds:datastoreItem xmlns:ds="http://schemas.openxmlformats.org/officeDocument/2006/customXml" ds:itemID="{29D72105-E419-4657-8EC8-6C73137ECF2E}">
+<ds:datastoreItem xmlns:ds="http://schemas.openxmlformats.org/officeDocument/2006/customXml" ds:itemID="{0935546A-FCFF-49CF-A534-6766F9A5EAFB}">
   <ds:schemaRefs>
-    <ds:schemaRef ds:uri="http://schemas.microsoft.com/sharepoint/v3/contenttype/forms"/>
+    <ds:schemaRef ds:uri="http://schemas.openxmlformats.org/package/2006/metadata/core-properties"/>
+    <ds:schemaRef ds:uri="c9eab120-891d-4e75-bbb7-983661d36c9c"/>
+    <ds:schemaRef ds:uri="http://purl.org/dc/terms/"/>
+    <ds:schemaRef ds:uri="http://schemas.microsoft.com/office/2006/documentManagement/types"/>
+    <ds:schemaRef ds:uri="http://schemas.microsoft.com/office/infopath/2007/PartnerControls"/>
+    <ds:schemaRef ds:uri="http://purl.org/dc/elements/1.1/"/>
+    <ds:schemaRef ds:uri="2cbdb79f-05cb-4beb-bf79-a6aafc29ddd5"/>
+    <ds:schemaRef ds:uri="http://www.w3.org/XML/1998/namespace"/>
+    <ds:schemaRef ds:uri="http://schemas.microsoft.com/office/2006/metadata/properties"/>
+    <ds:schemaRef ds:uri="http://purl.org/dc/dcmitype/"/>
   </ds:schemaRefs>
 </ds:datastoreItem>
 </file>
@@ -11377,18 +11524,9 @@
 </file>
 
 <file path=customXml/itemProps3.xml><?xml version="1.0" encoding="utf-8"?>
-<ds:datastoreItem xmlns:ds="http://schemas.openxmlformats.org/officeDocument/2006/customXml" ds:itemID="{0935546A-FCFF-49CF-A534-6766F9A5EAFB}">
+<ds:datastoreItem xmlns:ds="http://schemas.openxmlformats.org/officeDocument/2006/customXml" ds:itemID="{29D72105-E419-4657-8EC8-6C73137ECF2E}">
   <ds:schemaRefs>
-    <ds:schemaRef ds:uri="http://schemas.openxmlformats.org/package/2006/metadata/core-properties"/>
-    <ds:schemaRef ds:uri="c9eab120-891d-4e75-bbb7-983661d36c9c"/>
-    <ds:schemaRef ds:uri="http://purl.org/dc/terms/"/>
-    <ds:schemaRef ds:uri="http://schemas.microsoft.com/office/2006/documentManagement/types"/>
-    <ds:schemaRef ds:uri="http://schemas.microsoft.com/office/infopath/2007/PartnerControls"/>
-    <ds:schemaRef ds:uri="http://purl.org/dc/elements/1.1/"/>
-    <ds:schemaRef ds:uri="2cbdb79f-05cb-4beb-bf79-a6aafc29ddd5"/>
-    <ds:schemaRef ds:uri="http://www.w3.org/XML/1998/namespace"/>
-    <ds:schemaRef ds:uri="http://schemas.microsoft.com/office/2006/metadata/properties"/>
-    <ds:schemaRef ds:uri="http://purl.org/dc/dcmitype/"/>
+    <ds:schemaRef ds:uri="http://schemas.microsoft.com/sharepoint/v3/contenttype/forms"/>
   </ds:schemaRefs>
 </ds:datastoreItem>
 </file>
</xml_diff>

<commit_message>
update imgs result pca+cluster col b scale
</commit_message>
<xml_diff>
--- a/presentation_CARLASSARA_10601118.pptx
+++ b/presentation_CARLASSARA_10601118.pptx
@@ -3306,10 +3306,10 @@
       </p:pic>
       <p:pic>
         <p:nvPicPr>
-          <p:cNvPr id="3" name="Picture 2">
-            <a:extLst>
-              <a:ext uri="{FF2B5EF4-FFF2-40B4-BE49-F238E27FC236}">
-                <a16:creationId xmlns:a16="http://schemas.microsoft.com/office/drawing/2014/main" id="{670DA7F4-3C6A-44C4-B938-CE885B9DBDA5}"/>
+          <p:cNvPr id="6" name="Picture 5">
+            <a:extLst>
+              <a:ext uri="{FF2B5EF4-FFF2-40B4-BE49-F238E27FC236}">
+                <a16:creationId xmlns:a16="http://schemas.microsoft.com/office/drawing/2014/main" id="{9DE06DE2-BEA6-4831-BDF1-0316AD477DFF}"/>
               </a:ext>
             </a:extLst>
           </p:cNvPr>
@@ -3332,7 +3332,7 @@
         </p:blipFill>
         <p:spPr>
           <a:xfrm>
-            <a:off x="0" y="304800"/>
+            <a:off x="6096000" y="304800"/>
             <a:ext cx="6096000" cy="4876800"/>
           </a:xfrm>
           <a:prstGeom prst="rect">
@@ -3342,10 +3342,10 @@
       </p:pic>
       <p:pic>
         <p:nvPicPr>
-          <p:cNvPr id="6" name="Picture 5">
-            <a:extLst>
-              <a:ext uri="{FF2B5EF4-FFF2-40B4-BE49-F238E27FC236}">
-                <a16:creationId xmlns:a16="http://schemas.microsoft.com/office/drawing/2014/main" id="{9DE06DE2-BEA6-4831-BDF1-0316AD477DFF}"/>
+          <p:cNvPr id="10" name="Picture 9">
+            <a:extLst>
+              <a:ext uri="{FF2B5EF4-FFF2-40B4-BE49-F238E27FC236}">
+                <a16:creationId xmlns:a16="http://schemas.microsoft.com/office/drawing/2014/main" id="{7311FFA9-ABF0-4776-ACC8-6C4F0827C1F4}"/>
               </a:ext>
             </a:extLst>
           </p:cNvPr>
@@ -3368,7 +3368,7 @@
         </p:blipFill>
         <p:spPr>
           <a:xfrm>
-            <a:off x="6096000" y="304800"/>
+            <a:off x="0" y="304800"/>
             <a:ext cx="6096000" cy="4876800"/>
           </a:xfrm>
           <a:prstGeom prst="rect">
@@ -10583,12 +10583,11 @@
 </file>
 
 <file path=customXml/item1.xml><?xml version="1.0" encoding="utf-8"?>
-<?mso-contentType ?>
-<FormTemplates xmlns="http://schemas.microsoft.com/sharepoint/v3/contenttype/forms">
-  <Display>DocumentLibraryForm</Display>
-  <Edit>DocumentLibraryForm</Edit>
-  <New>DocumentLibraryForm</New>
-</FormTemplates>
+<p:properties xmlns:p="http://schemas.microsoft.com/office/2006/metadata/properties" xmlns:xsi="http://www.w3.org/2001/XMLSchema-instance" xmlns:pc="http://schemas.microsoft.com/office/infopath/2007/PartnerControls">
+  <documentManagement>
+    <_activity xmlns="c9eab120-891d-4e75-bbb7-983661d36c9c" xsi:nil="true"/>
+  </documentManagement>
+</p:properties>
 </file>
 
 <file path=customXml/item2.xml><?xml version="1.0" encoding="utf-8"?>
@@ -10821,17 +10820,27 @@
 </file>
 
 <file path=customXml/item3.xml><?xml version="1.0" encoding="utf-8"?>
-<p:properties xmlns:p="http://schemas.microsoft.com/office/2006/metadata/properties" xmlns:xsi="http://www.w3.org/2001/XMLSchema-instance" xmlns:pc="http://schemas.microsoft.com/office/infopath/2007/PartnerControls">
-  <documentManagement>
-    <_activity xmlns="c9eab120-891d-4e75-bbb7-983661d36c9c" xsi:nil="true"/>
-  </documentManagement>
-</p:properties>
+<?mso-contentType ?>
+<FormTemplates xmlns="http://schemas.microsoft.com/sharepoint/v3/contenttype/forms">
+  <Display>DocumentLibraryForm</Display>
+  <Edit>DocumentLibraryForm</Edit>
+  <New>DocumentLibraryForm</New>
+</FormTemplates>
 </file>
 
 <file path=customXml/itemProps1.xml><?xml version="1.0" encoding="utf-8"?>
-<ds:datastoreItem xmlns:ds="http://schemas.openxmlformats.org/officeDocument/2006/customXml" ds:itemID="{29D72105-E419-4657-8EC8-6C73137ECF2E}">
+<ds:datastoreItem xmlns:ds="http://schemas.openxmlformats.org/officeDocument/2006/customXml" ds:itemID="{0935546A-FCFF-49CF-A534-6766F9A5EAFB}">
   <ds:schemaRefs>
-    <ds:schemaRef ds:uri="http://schemas.microsoft.com/sharepoint/v3/contenttype/forms"/>
+    <ds:schemaRef ds:uri="http://schemas.openxmlformats.org/package/2006/metadata/core-properties"/>
+    <ds:schemaRef ds:uri="c9eab120-891d-4e75-bbb7-983661d36c9c"/>
+    <ds:schemaRef ds:uri="http://purl.org/dc/terms/"/>
+    <ds:schemaRef ds:uri="http://schemas.microsoft.com/office/2006/documentManagement/types"/>
+    <ds:schemaRef ds:uri="http://schemas.microsoft.com/office/infopath/2007/PartnerControls"/>
+    <ds:schemaRef ds:uri="http://purl.org/dc/elements/1.1/"/>
+    <ds:schemaRef ds:uri="2cbdb79f-05cb-4beb-bf79-a6aafc29ddd5"/>
+    <ds:schemaRef ds:uri="http://www.w3.org/XML/1998/namespace"/>
+    <ds:schemaRef ds:uri="http://schemas.microsoft.com/office/2006/metadata/properties"/>
+    <ds:schemaRef ds:uri="http://purl.org/dc/dcmitype/"/>
   </ds:schemaRefs>
 </ds:datastoreItem>
 </file>
@@ -10856,18 +10865,9 @@
 </file>
 
 <file path=customXml/itemProps3.xml><?xml version="1.0" encoding="utf-8"?>
-<ds:datastoreItem xmlns:ds="http://schemas.openxmlformats.org/officeDocument/2006/customXml" ds:itemID="{0935546A-FCFF-49CF-A534-6766F9A5EAFB}">
+<ds:datastoreItem xmlns:ds="http://schemas.openxmlformats.org/officeDocument/2006/customXml" ds:itemID="{29D72105-E419-4657-8EC8-6C73137ECF2E}">
   <ds:schemaRefs>
-    <ds:schemaRef ds:uri="http://schemas.openxmlformats.org/package/2006/metadata/core-properties"/>
-    <ds:schemaRef ds:uri="c9eab120-891d-4e75-bbb7-983661d36c9c"/>
-    <ds:schemaRef ds:uri="http://purl.org/dc/terms/"/>
-    <ds:schemaRef ds:uri="http://schemas.microsoft.com/office/2006/documentManagement/types"/>
-    <ds:schemaRef ds:uri="http://schemas.microsoft.com/office/infopath/2007/PartnerControls"/>
-    <ds:schemaRef ds:uri="http://purl.org/dc/elements/1.1/"/>
-    <ds:schemaRef ds:uri="2cbdb79f-05cb-4beb-bf79-a6aafc29ddd5"/>
-    <ds:schemaRef ds:uri="http://www.w3.org/XML/1998/namespace"/>
-    <ds:schemaRef ds:uri="http://schemas.microsoft.com/office/2006/metadata/properties"/>
-    <ds:schemaRef ds:uri="http://purl.org/dc/dcmitype/"/>
+    <ds:schemaRef ds:uri="http://schemas.microsoft.com/sharepoint/v3/contenttype/forms"/>
   </ds:schemaRefs>
 </ds:datastoreItem>
 </file>
</xml_diff>

<commit_message>
update imgs results pca+cluster col m shape 1nR
</commit_message>
<xml_diff>
--- a/presentation_CARLASSARA_10601118.pptx
+++ b/presentation_CARLASSARA_10601118.pptx
@@ -247,7 +247,7 @@
           <a:p>
             <a:fld id="{2E347CE9-1F5D-4CEF-9CA7-664B3EF9808B}" type="datetimeFigureOut">
               <a:rPr lang="en-GB" smtClean="0"/>
-              <a:t>10/07/2024</a:t>
+              <a:t>11/07/2024</a:t>
             </a:fld>
             <a:endParaRPr lang="en-GB"/>
           </a:p>
@@ -654,7 +654,7 @@
           <a:p>
             <a:fld id="{1D8BD707-D9CF-40AE-B4C6-C98DA3205C09}" type="datetimeFigureOut">
               <a:rPr lang="en-US"/>
-              <a:t>7/10/2024</a:t>
+              <a:t>7/11/2024</a:t>
             </a:fld>
             <a:endParaRPr lang="en-US"/>
           </a:p>
@@ -829,7 +829,7 @@
           <a:p>
             <a:fld id="{1D8BD707-D9CF-40AE-B4C6-C98DA3205C09}" type="datetimeFigureOut">
               <a:rPr lang="en-US"/>
-              <a:t>7/10/2024</a:t>
+              <a:t>7/11/2024</a:t>
             </a:fld>
             <a:endParaRPr lang="en-US"/>
           </a:p>
@@ -1043,7 +1043,7 @@
           <a:p>
             <a:fld id="{1D8BD707-D9CF-40AE-B4C6-C98DA3205C09}" type="datetimeFigureOut">
               <a:rPr lang="en-US"/>
-              <a:t>7/10/2024</a:t>
+              <a:t>7/11/2024</a:t>
             </a:fld>
             <a:endParaRPr lang="en-US"/>
           </a:p>
@@ -1191,7 +1191,7 @@
           <a:p>
             <a:fld id="{1D8BD707-D9CF-40AE-B4C6-C98DA3205C09}" type="datetimeFigureOut">
               <a:rPr lang="en-US"/>
-              <a:t>7/10/2024</a:t>
+              <a:t>7/11/2024</a:t>
             </a:fld>
             <a:endParaRPr lang="en-US"/>
           </a:p>
@@ -1310,7 +1310,7 @@
           <a:p>
             <a:fld id="{1D8BD707-D9CF-40AE-B4C6-C98DA3205C09}" type="datetimeFigureOut">
               <a:rPr lang="en-US"/>
-              <a:t>7/10/2024</a:t>
+              <a:t>7/11/2024</a:t>
             </a:fld>
             <a:endParaRPr lang="en-US"/>
           </a:p>
@@ -1679,7 +1679,7 @@
           <a:p>
             <a:fld id="{1D8BD707-D9CF-40AE-B4C6-C98DA3205C09}" type="datetimeFigureOut">
               <a:rPr lang="en-US"/>
-              <a:t>7/10/2024</a:t>
+              <a:t>7/11/2024</a:t>
             </a:fld>
             <a:endParaRPr lang="en-US"/>
           </a:p>
@@ -3269,10 +3269,10 @@
       </p:pic>
       <p:pic>
         <p:nvPicPr>
-          <p:cNvPr id="10" name="Picture 9">
+          <p:cNvPr id="9" name="Picture 8">
             <a:extLst>
               <a:ext uri="{FF2B5EF4-FFF2-40B4-BE49-F238E27FC236}">
-                <a16:creationId xmlns:a16="http://schemas.microsoft.com/office/drawing/2014/main" id="{52C055B9-55D4-401E-94FE-CE2D04CDB98B}"/>
+                <a16:creationId xmlns:a16="http://schemas.microsoft.com/office/drawing/2014/main" id="{2DD0C88C-6D57-4674-AC4B-2495F763459D}"/>
               </a:ext>
             </a:extLst>
           </p:cNvPr>
@@ -10209,11 +10209,12 @@
 </file>
 
 <file path=customXml/item1.xml><?xml version="1.0" encoding="utf-8"?>
-<p:properties xmlns:p="http://schemas.microsoft.com/office/2006/metadata/properties" xmlns:xsi="http://www.w3.org/2001/XMLSchema-instance" xmlns:pc="http://schemas.microsoft.com/office/infopath/2007/PartnerControls">
-  <documentManagement>
-    <_activity xmlns="c9eab120-891d-4e75-bbb7-983661d36c9c" xsi:nil="true"/>
-  </documentManagement>
-</p:properties>
+<?mso-contentType ?>
+<FormTemplates xmlns="http://schemas.microsoft.com/sharepoint/v3/contenttype/forms">
+  <Display>DocumentLibraryForm</Display>
+  <Edit>DocumentLibraryForm</Edit>
+  <New>DocumentLibraryForm</New>
+</FormTemplates>
 </file>
 
 <file path=customXml/item2.xml><?xml version="1.0" encoding="utf-8"?>
@@ -10446,27 +10447,17 @@
 </file>
 
 <file path=customXml/item3.xml><?xml version="1.0" encoding="utf-8"?>
-<?mso-contentType ?>
-<FormTemplates xmlns="http://schemas.microsoft.com/sharepoint/v3/contenttype/forms">
-  <Display>DocumentLibraryForm</Display>
-  <Edit>DocumentLibraryForm</Edit>
-  <New>DocumentLibraryForm</New>
-</FormTemplates>
+<p:properties xmlns:p="http://schemas.microsoft.com/office/2006/metadata/properties" xmlns:xsi="http://www.w3.org/2001/XMLSchema-instance" xmlns:pc="http://schemas.microsoft.com/office/infopath/2007/PartnerControls">
+  <documentManagement>
+    <_activity xmlns="c9eab120-891d-4e75-bbb7-983661d36c9c" xsi:nil="true"/>
+  </documentManagement>
+</p:properties>
 </file>
 
 <file path=customXml/itemProps1.xml><?xml version="1.0" encoding="utf-8"?>
-<ds:datastoreItem xmlns:ds="http://schemas.openxmlformats.org/officeDocument/2006/customXml" ds:itemID="{0935546A-FCFF-49CF-A534-6766F9A5EAFB}">
+<ds:datastoreItem xmlns:ds="http://schemas.openxmlformats.org/officeDocument/2006/customXml" ds:itemID="{29D72105-E419-4657-8EC8-6C73137ECF2E}">
   <ds:schemaRefs>
-    <ds:schemaRef ds:uri="http://schemas.openxmlformats.org/package/2006/metadata/core-properties"/>
-    <ds:schemaRef ds:uri="c9eab120-891d-4e75-bbb7-983661d36c9c"/>
-    <ds:schemaRef ds:uri="http://purl.org/dc/terms/"/>
-    <ds:schemaRef ds:uri="http://schemas.microsoft.com/office/2006/documentManagement/types"/>
-    <ds:schemaRef ds:uri="http://schemas.microsoft.com/office/infopath/2007/PartnerControls"/>
-    <ds:schemaRef ds:uri="http://purl.org/dc/elements/1.1/"/>
-    <ds:schemaRef ds:uri="2cbdb79f-05cb-4beb-bf79-a6aafc29ddd5"/>
-    <ds:schemaRef ds:uri="http://www.w3.org/XML/1998/namespace"/>
-    <ds:schemaRef ds:uri="http://schemas.microsoft.com/office/2006/metadata/properties"/>
-    <ds:schemaRef ds:uri="http://purl.org/dc/dcmitype/"/>
+    <ds:schemaRef ds:uri="http://schemas.microsoft.com/sharepoint/v3/contenttype/forms"/>
   </ds:schemaRefs>
 </ds:datastoreItem>
 </file>
@@ -10491,9 +10482,18 @@
 </file>
 
 <file path=customXml/itemProps3.xml><?xml version="1.0" encoding="utf-8"?>
-<ds:datastoreItem xmlns:ds="http://schemas.openxmlformats.org/officeDocument/2006/customXml" ds:itemID="{29D72105-E419-4657-8EC8-6C73137ECF2E}">
+<ds:datastoreItem xmlns:ds="http://schemas.openxmlformats.org/officeDocument/2006/customXml" ds:itemID="{0935546A-FCFF-49CF-A534-6766F9A5EAFB}">
   <ds:schemaRefs>
-    <ds:schemaRef ds:uri="http://schemas.microsoft.com/sharepoint/v3/contenttype/forms"/>
+    <ds:schemaRef ds:uri="http://schemas.openxmlformats.org/package/2006/metadata/core-properties"/>
+    <ds:schemaRef ds:uri="c9eab120-891d-4e75-bbb7-983661d36c9c"/>
+    <ds:schemaRef ds:uri="http://purl.org/dc/terms/"/>
+    <ds:schemaRef ds:uri="http://schemas.microsoft.com/office/2006/documentManagement/types"/>
+    <ds:schemaRef ds:uri="http://schemas.microsoft.com/office/infopath/2007/PartnerControls"/>
+    <ds:schemaRef ds:uri="http://purl.org/dc/elements/1.1/"/>
+    <ds:schemaRef ds:uri="2cbdb79f-05cb-4beb-bf79-a6aafc29ddd5"/>
+    <ds:schemaRef ds:uri="http://www.w3.org/XML/1998/namespace"/>
+    <ds:schemaRef ds:uri="http://schemas.microsoft.com/office/2006/metadata/properties"/>
+    <ds:schemaRef ds:uri="http://purl.org/dc/dcmitype/"/>
   </ds:schemaRefs>
 </ds:datastoreItem>
 </file>
</xml_diff>